<commit_message>
Updated ModelComponent's diagrams under developer guide
</commit_message>
<xml_diff>
--- a/docs/diagrams/ModelComponentClassBetterOopDiagram.pptx
+++ b/docs/diagrams/ModelComponentClassBetterOopDiagram.pptx
@@ -208,7 +208,7 @@
           <a:p>
             <a:fld id="{F5CC4B3F-88C1-4FFA-B1B6-F41C21DC6924}" type="datetimeFigureOut">
               <a:rPr lang="en-US" smtClean="0"/>
-              <a:t>11/8/2018</a:t>
+              <a:t>11/10/2018</a:t>
             </a:fld>
             <a:endParaRPr lang="en-US"/>
           </a:p>
@@ -654,7 +654,7 @@
           <a:p>
             <a:fld id="{78C97017-6FC3-485B-9764-EAC9E56C1D49}" type="datetimeFigureOut">
               <a:rPr lang="en-US" smtClean="0"/>
-              <a:t>11/8/2018</a:t>
+              <a:t>11/10/2018</a:t>
             </a:fld>
             <a:endParaRPr lang="en-US"/>
           </a:p>
@@ -822,7 +822,7 @@
           <a:p>
             <a:fld id="{78C97017-6FC3-485B-9764-EAC9E56C1D49}" type="datetimeFigureOut">
               <a:rPr lang="en-US" smtClean="0"/>
-              <a:t>11/8/2018</a:t>
+              <a:t>11/10/2018</a:t>
             </a:fld>
             <a:endParaRPr lang="en-US"/>
           </a:p>
@@ -1000,7 +1000,7 @@
           <a:p>
             <a:fld id="{78C97017-6FC3-485B-9764-EAC9E56C1D49}" type="datetimeFigureOut">
               <a:rPr lang="en-US" smtClean="0"/>
-              <a:t>11/8/2018</a:t>
+              <a:t>11/10/2018</a:t>
             </a:fld>
             <a:endParaRPr lang="en-US"/>
           </a:p>
@@ -1168,7 +1168,7 @@
           <a:p>
             <a:fld id="{78C97017-6FC3-485B-9764-EAC9E56C1D49}" type="datetimeFigureOut">
               <a:rPr lang="en-US" smtClean="0"/>
-              <a:t>11/8/2018</a:t>
+              <a:t>11/10/2018</a:t>
             </a:fld>
             <a:endParaRPr lang="en-US"/>
           </a:p>
@@ -1413,7 +1413,7 @@
           <a:p>
             <a:fld id="{78C97017-6FC3-485B-9764-EAC9E56C1D49}" type="datetimeFigureOut">
               <a:rPr lang="en-US" smtClean="0"/>
-              <a:t>11/8/2018</a:t>
+              <a:t>11/10/2018</a:t>
             </a:fld>
             <a:endParaRPr lang="en-US"/>
           </a:p>
@@ -1698,7 +1698,7 @@
           <a:p>
             <a:fld id="{78C97017-6FC3-485B-9764-EAC9E56C1D49}" type="datetimeFigureOut">
               <a:rPr lang="en-US" smtClean="0"/>
-              <a:t>11/8/2018</a:t>
+              <a:t>11/10/2018</a:t>
             </a:fld>
             <a:endParaRPr lang="en-US"/>
           </a:p>
@@ -2117,7 +2117,7 @@
           <a:p>
             <a:fld id="{78C97017-6FC3-485B-9764-EAC9E56C1D49}" type="datetimeFigureOut">
               <a:rPr lang="en-US" smtClean="0"/>
-              <a:t>11/8/2018</a:t>
+              <a:t>11/10/2018</a:t>
             </a:fld>
             <a:endParaRPr lang="en-US"/>
           </a:p>
@@ -2234,7 +2234,7 @@
           <a:p>
             <a:fld id="{78C97017-6FC3-485B-9764-EAC9E56C1D49}" type="datetimeFigureOut">
               <a:rPr lang="en-US" smtClean="0"/>
-              <a:t>11/8/2018</a:t>
+              <a:t>11/10/2018</a:t>
             </a:fld>
             <a:endParaRPr lang="en-US"/>
           </a:p>
@@ -2329,7 +2329,7 @@
           <a:p>
             <a:fld id="{78C97017-6FC3-485B-9764-EAC9E56C1D49}" type="datetimeFigureOut">
               <a:rPr lang="en-US" smtClean="0"/>
-              <a:t>11/8/2018</a:t>
+              <a:t>11/10/2018</a:t>
             </a:fld>
             <a:endParaRPr lang="en-US"/>
           </a:p>
@@ -2604,7 +2604,7 @@
           <a:p>
             <a:fld id="{78C97017-6FC3-485B-9764-EAC9E56C1D49}" type="datetimeFigureOut">
               <a:rPr lang="en-US" smtClean="0"/>
-              <a:t>11/8/2018</a:t>
+              <a:t>11/10/2018</a:t>
             </a:fld>
             <a:endParaRPr lang="en-US"/>
           </a:p>
@@ -2856,7 +2856,7 @@
           <a:p>
             <a:fld id="{78C97017-6FC3-485B-9764-EAC9E56C1D49}" type="datetimeFigureOut">
               <a:rPr lang="en-US" smtClean="0"/>
-              <a:t>11/8/2018</a:t>
+              <a:t>11/10/2018</a:t>
             </a:fld>
             <a:endParaRPr lang="en-US"/>
           </a:p>
@@ -3067,7 +3067,7 @@
           <a:p>
             <a:fld id="{78C97017-6FC3-485B-9764-EAC9E56C1D49}" type="datetimeFigureOut">
               <a:rPr lang="en-US" smtClean="0"/>
-              <a:t>11/8/2018</a:t>
+              <a:t>11/10/2018</a:t>
             </a:fld>
             <a:endParaRPr lang="en-US"/>
           </a:p>
@@ -3598,7 +3598,7 @@
           <a:p>
             <a:pPr algn="ctr"/>
             <a:r>
-              <a:rPr lang="en-US" sz="1050" dirty="0" err="1">
+              <a:rPr lang="en-US" sz="1050" dirty="0">
                 <a:solidFill>
                   <a:schemeClr val="bg1"/>
                 </a:solidFill>
@@ -3657,7 +3657,7 @@
           <a:p>
             <a:pPr algn="ctr"/>
             <a:r>
-              <a:rPr lang="en-US" sz="1050" dirty="0" err="1">
+              <a:rPr lang="en-US" sz="1050" dirty="0">
                 <a:solidFill>
                   <a:schemeClr val="bg1"/>
                 </a:solidFill>
@@ -4042,7 +4042,7 @@
           <a:p>
             <a:pPr algn="ctr"/>
             <a:r>
-              <a:rPr lang="en-US" sz="1050" dirty="0" err="1">
+              <a:rPr lang="en-US" sz="1050" dirty="0">
                 <a:solidFill>
                   <a:srgbClr val="7030A0"/>
                 </a:solidFill>
@@ -4184,7 +4184,7 @@
           <a:p>
             <a:pPr algn="ctr"/>
             <a:r>
-              <a:rPr lang="en-US" sz="1050" dirty="0" err="1">
+              <a:rPr lang="en-US" sz="1050" dirty="0">
                 <a:solidFill>
                   <a:srgbClr val="7030A0"/>
                 </a:solidFill>
@@ -4963,7 +4963,7 @@
               </a:rPr>
             </a:br>
             <a:r>
-              <a:rPr lang="en-US" sz="1050" dirty="0" err="1">
+              <a:rPr lang="en-US" sz="1050" dirty="0">
                 <a:solidFill>
                   <a:srgbClr val="7030A0"/>
                 </a:solidFill>
@@ -5262,7 +5262,7 @@
           <a:p>
             <a:pPr algn="ctr"/>
             <a:r>
-              <a:rPr lang="en-US" sz="1050" dirty="0" err="1">
+              <a:rPr lang="en-US" sz="1050" dirty="0">
                 <a:solidFill>
                   <a:srgbClr val="7030A0"/>
                 </a:solidFill>
@@ -5873,7 +5873,7 @@
               </a:rPr>
             </a:br>
             <a:r>
-              <a:rPr lang="en-US" sz="1050" dirty="0" err="1">
+              <a:rPr lang="en-US" sz="1050" dirty="0">
                 <a:solidFill>
                   <a:srgbClr val="7030A0"/>
                 </a:solidFill>
@@ -5929,7 +5929,7 @@
           <a:p>
             <a:pPr algn="ctr"/>
             <a:r>
-              <a:rPr lang="en-US" sz="1050" dirty="0" err="1">
+              <a:rPr lang="en-US" sz="1050" dirty="0">
                 <a:solidFill>
                   <a:srgbClr val="7030A0"/>
                 </a:solidFill>
@@ -6141,7 +6141,7 @@
           <a:p>
             <a:pPr algn="ctr"/>
             <a:r>
-              <a:rPr lang="en-US" sz="1050" dirty="0" err="1">
+              <a:rPr lang="en-US" sz="1050" dirty="0">
                 <a:solidFill>
                   <a:srgbClr val="7030A0"/>
                 </a:solidFill>
@@ -6301,7 +6301,7 @@
           <a:p>
             <a:pPr algn="ctr"/>
             <a:r>
-              <a:rPr lang="en-US" sz="1050" dirty="0" err="1">
+              <a:rPr lang="en-US" sz="1050" dirty="0">
                 <a:solidFill>
                   <a:srgbClr val="7030A0"/>
                 </a:solidFill>
@@ -7439,7 +7439,7 @@
               </a:rPr>
             </a:br>
             <a:r>
-              <a:rPr lang="en-US" sz="1050" dirty="0" err="1">
+              <a:rPr lang="en-US" sz="1050" dirty="0">
                 <a:solidFill>
                   <a:srgbClr val="7030A0"/>
                 </a:solidFill>
@@ -7501,7 +7501,7 @@
           <a:p>
             <a:pPr algn="ctr"/>
             <a:r>
-              <a:rPr lang="en-US" sz="1050" dirty="0" err="1">
+              <a:rPr lang="en-US" sz="1050" dirty="0">
                 <a:solidFill>
                   <a:srgbClr val="7030A0"/>
                 </a:solidFill>
@@ -7621,7 +7621,7 @@
           <a:p>
             <a:pPr algn="ctr"/>
             <a:r>
-              <a:rPr lang="en-US" sz="1050" dirty="0" err="1">
+              <a:rPr lang="en-US" sz="1050" dirty="0">
                 <a:solidFill>
                   <a:srgbClr val="7030A0"/>
                 </a:solidFill>
@@ -7931,7 +7931,7 @@
           <a:p>
             <a:pPr algn="ctr"/>
             <a:r>
-              <a:rPr lang="en-US" sz="1050" dirty="0" err="1">
+              <a:rPr lang="en-US" sz="1050" dirty="0">
                 <a:solidFill>
                   <a:srgbClr val="7030A0"/>
                 </a:solidFill>
@@ -8392,7 +8392,7 @@
           <a:p>
             <a:pPr algn="ctr"/>
             <a:r>
-              <a:rPr lang="en-US" sz="1050" dirty="0" err="1">
+              <a:rPr lang="en-US" sz="1050" dirty="0">
                 <a:solidFill>
                   <a:srgbClr val="7030A0"/>
                 </a:solidFill>
@@ -8552,7 +8552,7 @@
           <a:p>
             <a:pPr algn="ctr"/>
             <a:r>
-              <a:rPr lang="en-US" sz="1050" dirty="0" err="1">
+              <a:rPr lang="en-US" sz="1050" dirty="0">
                 <a:solidFill>
                   <a:srgbClr val="7030A0"/>
                 </a:solidFill>
@@ -8929,7 +8929,7 @@
           <a:p>
             <a:pPr algn="ctr"/>
             <a:r>
-              <a:rPr lang="en-US" sz="1050" dirty="0" err="1">
+              <a:rPr lang="en-US" sz="1050" dirty="0">
                 <a:solidFill>
                   <a:srgbClr val="7030A0"/>
                 </a:solidFill>
@@ -9039,7 +9039,7 @@
           <a:p>
             <a:pPr algn="ctr"/>
             <a:r>
-              <a:rPr lang="en-US" sz="1050" dirty="0" err="1">
+              <a:rPr lang="en-US" sz="1050" dirty="0">
                 <a:solidFill>
                   <a:srgbClr val="7030A0"/>
                 </a:solidFill>
@@ -9149,7 +9149,7 @@
           <a:p>
             <a:pPr algn="ctr"/>
             <a:r>
-              <a:rPr lang="en-US" sz="1050" dirty="0" err="1">
+              <a:rPr lang="en-US" sz="1050" dirty="0">
                 <a:solidFill>
                   <a:srgbClr val="7030A0"/>
                 </a:solidFill>
@@ -9640,7 +9640,7 @@
               </a:rPr>
             </a:br>
             <a:r>
-              <a:rPr lang="en-US" sz="1050" dirty="0" err="1">
+              <a:rPr lang="en-US" sz="1050" dirty="0">
                 <a:solidFill>
                   <a:srgbClr val="7030A0"/>
                 </a:solidFill>
@@ -9702,7 +9702,7 @@
           <a:p>
             <a:pPr algn="ctr"/>
             <a:r>
-              <a:rPr lang="en-US" sz="1050" dirty="0" err="1">
+              <a:rPr lang="en-US" sz="1050" dirty="0">
                 <a:solidFill>
                   <a:srgbClr val="7030A0"/>
                 </a:solidFill>
@@ -9921,7 +9921,7 @@
           <a:p>
             <a:pPr algn="ctr"/>
             <a:r>
-              <a:rPr lang="en-US" sz="1050" dirty="0" err="1">
+              <a:rPr lang="en-US" sz="1050" dirty="0">
                 <a:solidFill>
                   <a:srgbClr val="7030A0"/>
                 </a:solidFill>
@@ -10081,7 +10081,7 @@
           <a:p>
             <a:pPr algn="ctr"/>
             <a:r>
-              <a:rPr lang="en-US" sz="1050" dirty="0" err="1">
+              <a:rPr lang="en-US" sz="1050" dirty="0">
                 <a:solidFill>
                   <a:srgbClr val="7030A0"/>
                 </a:solidFill>
@@ -10563,7 +10563,7 @@
           <a:p>
             <a:pPr algn="ctr"/>
             <a:r>
-              <a:rPr lang="en-US" sz="1050" dirty="0" err="1">
+              <a:rPr lang="en-US" sz="1050" dirty="0">
                 <a:solidFill>
                   <a:srgbClr val="7030A0"/>
                 </a:solidFill>
@@ -10673,7 +10673,7 @@
           <a:p>
             <a:pPr algn="ctr"/>
             <a:r>
-              <a:rPr lang="en-US" sz="1050" dirty="0" err="1">
+              <a:rPr lang="en-US" sz="1050" dirty="0">
                 <a:solidFill>
                   <a:srgbClr val="7030A0"/>
                 </a:solidFill>
@@ -11164,7 +11164,7 @@
               </a:rPr>
             </a:br>
             <a:r>
-              <a:rPr lang="en-US" sz="1050" dirty="0" err="1">
+              <a:rPr lang="en-US" sz="1050" dirty="0">
                 <a:solidFill>
                   <a:srgbClr val="7030A0"/>
                 </a:solidFill>
@@ -11226,7 +11226,7 @@
           <a:p>
             <a:pPr algn="ctr"/>
             <a:r>
-              <a:rPr lang="en-US" sz="1050" dirty="0" err="1">
+              <a:rPr lang="en-US" sz="1050" dirty="0">
                 <a:solidFill>
                   <a:srgbClr val="7030A0"/>
                 </a:solidFill>
@@ -11396,7 +11396,7 @@
           <a:p>
             <a:pPr algn="ctr"/>
             <a:r>
-              <a:rPr lang="en-US" sz="1050" dirty="0" err="1">
+              <a:rPr lang="en-US" sz="1050" dirty="0">
                 <a:solidFill>
                   <a:srgbClr val="7030A0"/>
                 </a:solidFill>

</xml_diff>